<commit_message>
updated a slide on fc1 arch
</commit_message>
<xml_diff>
--- a/WeeklyPresentations/update7_04_23.pptx
+++ b/WeeklyPresentations/update7_04_23.pptx
@@ -8,8 +8,9 @@
     <p:sldId id="256" r:id="rId2"/>
     <p:sldId id="257" r:id="rId3"/>
     <p:sldId id="258" r:id="rId4"/>
-    <p:sldId id="259" r:id="rId5"/>
-    <p:sldId id="260" r:id="rId6"/>
+    <p:sldId id="261" r:id="rId5"/>
+    <p:sldId id="259" r:id="rId6"/>
+    <p:sldId id="260" r:id="rId7"/>
   </p:sldIdLst>
   <p:sldSz cx="12192000" cy="6858000"/>
   <p:notesSz cx="6858000" cy="9144000"/>
@@ -264,7 +265,7 @@
             <a:fld id="{B61BEF0D-F0BB-DE4B-95CE-6DB70DBA9567}" type="datetimeFigureOut">
               <a:rPr lang="en-US" smtClean="0"/>
               <a:pPr/>
-              <a:t>4/22/2019</a:t>
+              <a:t>4/23/2019</a:t>
             </a:fld>
             <a:endParaRPr lang="en-US" dirty="0"/>
           </a:p>
@@ -464,7 +465,7 @@
             <a:fld id="{B61BEF0D-F0BB-DE4B-95CE-6DB70DBA9567}" type="datetimeFigureOut">
               <a:rPr lang="en-US" smtClean="0"/>
               <a:pPr/>
-              <a:t>4/22/2019</a:t>
+              <a:t>4/23/2019</a:t>
             </a:fld>
             <a:endParaRPr lang="en-US" dirty="0"/>
           </a:p>
@@ -674,7 +675,7 @@
             <a:fld id="{B61BEF0D-F0BB-DE4B-95CE-6DB70DBA9567}" type="datetimeFigureOut">
               <a:rPr lang="en-US" smtClean="0"/>
               <a:pPr/>
-              <a:t>4/22/2019</a:t>
+              <a:t>4/23/2019</a:t>
             </a:fld>
             <a:endParaRPr lang="en-US" dirty="0"/>
           </a:p>
@@ -874,7 +875,7 @@
             <a:fld id="{B61BEF0D-F0BB-DE4B-95CE-6DB70DBA9567}" type="datetimeFigureOut">
               <a:rPr lang="en-US" smtClean="0"/>
               <a:pPr/>
-              <a:t>4/22/2019</a:t>
+              <a:t>4/23/2019</a:t>
             </a:fld>
             <a:endParaRPr lang="en-US" dirty="0"/>
           </a:p>
@@ -1151,7 +1152,7 @@
             <a:fld id="{B61BEF0D-F0BB-DE4B-95CE-6DB70DBA9567}" type="datetimeFigureOut">
               <a:rPr lang="en-US" smtClean="0"/>
               <a:pPr/>
-              <a:t>4/22/2019</a:t>
+              <a:t>4/23/2019</a:t>
             </a:fld>
             <a:endParaRPr lang="en-US" dirty="0"/>
           </a:p>
@@ -1418,7 +1419,7 @@
             <a:fld id="{B61BEF0D-F0BB-DE4B-95CE-6DB70DBA9567}" type="datetimeFigureOut">
               <a:rPr lang="en-US" smtClean="0"/>
               <a:pPr/>
-              <a:t>4/22/2019</a:t>
+              <a:t>4/23/2019</a:t>
             </a:fld>
             <a:endParaRPr lang="en-US" dirty="0"/>
           </a:p>
@@ -1832,7 +1833,7 @@
             <a:fld id="{B61BEF0D-F0BB-DE4B-95CE-6DB70DBA9567}" type="datetimeFigureOut">
               <a:rPr lang="en-US" smtClean="0"/>
               <a:pPr/>
-              <a:t>4/22/2019</a:t>
+              <a:t>4/23/2019</a:t>
             </a:fld>
             <a:endParaRPr lang="en-US" dirty="0"/>
           </a:p>
@@ -1975,7 +1976,7 @@
             <a:fld id="{B61BEF0D-F0BB-DE4B-95CE-6DB70DBA9567}" type="datetimeFigureOut">
               <a:rPr lang="en-US" smtClean="0"/>
               <a:pPr/>
-              <a:t>4/22/2019</a:t>
+              <a:t>4/23/2019</a:t>
             </a:fld>
             <a:endParaRPr lang="en-US" dirty="0"/>
           </a:p>
@@ -2090,7 +2091,7 @@
             <a:fld id="{B61BEF0D-F0BB-DE4B-95CE-6DB70DBA9567}" type="datetimeFigureOut">
               <a:rPr lang="en-US" smtClean="0"/>
               <a:pPr/>
-              <a:t>4/22/2019</a:t>
+              <a:t>4/23/2019</a:t>
             </a:fld>
             <a:endParaRPr lang="en-US" dirty="0"/>
           </a:p>
@@ -2403,7 +2404,7 @@
             <a:fld id="{B61BEF0D-F0BB-DE4B-95CE-6DB70DBA9567}" type="datetimeFigureOut">
               <a:rPr lang="en-US" smtClean="0"/>
               <a:pPr/>
-              <a:t>4/22/2019</a:t>
+              <a:t>4/23/2019</a:t>
             </a:fld>
             <a:endParaRPr lang="en-US" dirty="0"/>
           </a:p>
@@ -2693,7 +2694,7 @@
             <a:fld id="{B61BEF0D-F0BB-DE4B-95CE-6DB70DBA9567}" type="datetimeFigureOut">
               <a:rPr lang="en-US" smtClean="0"/>
               <a:pPr/>
-              <a:t>4/22/2019</a:t>
+              <a:t>4/23/2019</a:t>
             </a:fld>
             <a:endParaRPr lang="en-US" dirty="0"/>
           </a:p>
@@ -2936,7 +2937,7 @@
             <a:fld id="{B61BEF0D-F0BB-DE4B-95CE-6DB70DBA9567}" type="datetimeFigureOut">
               <a:rPr lang="en-US" smtClean="0"/>
               <a:pPr/>
-              <a:t>4/22/2019</a:t>
+              <a:t>4/23/2019</a:t>
             </a:fld>
             <a:endParaRPr lang="en-US" dirty="0"/>
           </a:p>
@@ -3828,6 +3829,510 @@
           <p:cNvPr id="2" name="Title 1">
             <a:extLst>
               <a:ext uri="{FF2B5EF4-FFF2-40B4-BE49-F238E27FC236}">
+                <a16:creationId xmlns:a16="http://schemas.microsoft.com/office/drawing/2014/main" id="{51711798-4304-4A5B-A9D1-9C54A624169B}"/>
+              </a:ext>
+            </a:extLst>
+          </p:cNvPr>
+          <p:cNvSpPr>
+            <a:spLocks noGrp="1"/>
+          </p:cNvSpPr>
+          <p:nvPr>
+            <p:ph type="title"/>
+          </p:nvPr>
+        </p:nvSpPr>
+        <p:spPr/>
+        <p:txBody>
+          <a:bodyPr/>
+          <a:lstStyle/>
+          <a:p>
+            <a:r>
+              <a:rPr lang="en-US" altLang="zh-CN" dirty="0"/>
+              <a:t>Current FC1 Layer Architecture</a:t>
+            </a:r>
+            <a:endParaRPr lang="zh-CN" altLang="en-US" dirty="0"/>
+          </a:p>
+        </p:txBody>
+      </p:sp>
+      <p:sp>
+        <p:nvSpPr>
+          <p:cNvPr id="3" name="Content Placeholder 2">
+            <a:extLst>
+              <a:ext uri="{FF2B5EF4-FFF2-40B4-BE49-F238E27FC236}">
+                <a16:creationId xmlns:a16="http://schemas.microsoft.com/office/drawing/2014/main" id="{DD8F343C-5967-4A5C-B721-CD00D2B0C8EE}"/>
+              </a:ext>
+            </a:extLst>
+          </p:cNvPr>
+          <p:cNvSpPr>
+            <a:spLocks noGrp="1"/>
+          </p:cNvSpPr>
+          <p:nvPr>
+            <p:ph idx="1"/>
+          </p:nvPr>
+        </p:nvSpPr>
+        <p:spPr>
+          <a:xfrm>
+            <a:off x="838200" y="1825625"/>
+            <a:ext cx="5623560" cy="4351338"/>
+          </a:xfrm>
+        </p:spPr>
+        <p:txBody>
+          <a:bodyPr>
+            <a:normAutofit/>
+          </a:bodyPr>
+          <a:lstStyle/>
+          <a:p>
+            <a:r>
+              <a:rPr lang="en-US" altLang="zh-CN" dirty="0"/>
+              <a:t>Two 8-stage MAC pipelines</a:t>
+            </a:r>
+          </a:p>
+          <a:p>
+            <a:r>
+              <a:rPr lang="en-US" altLang="zh-CN" dirty="0"/>
+              <a:t>32 neurons, each with 8*7*7 = 784 weights</a:t>
+            </a:r>
+          </a:p>
+          <a:p>
+            <a:r>
+              <a:rPr lang="en-US" altLang="zh-CN" dirty="0"/>
+              <a:t>8 weight dual-port BRAM to feed the pipelines</a:t>
+            </a:r>
+          </a:p>
+          <a:p>
+            <a:r>
+              <a:rPr lang="en-US" altLang="zh-CN" dirty="0"/>
+              <a:t>Since we have 8 BRAM, each BRAM stores the weights for 4 neurons</a:t>
+            </a:r>
+          </a:p>
+          <a:p>
+            <a:r>
+              <a:rPr lang="en-US" altLang="zh-CN" dirty="0"/>
+              <a:t>Scheduler iterates down the BRAM with 2 pointers</a:t>
+            </a:r>
+          </a:p>
+          <a:p>
+            <a:endParaRPr lang="zh-CN" altLang="en-US" dirty="0"/>
+          </a:p>
+        </p:txBody>
+      </p:sp>
+      <p:sp>
+        <p:nvSpPr>
+          <p:cNvPr id="4" name="Rectangle 3">
+            <a:extLst>
+              <a:ext uri="{FF2B5EF4-FFF2-40B4-BE49-F238E27FC236}">
+                <a16:creationId xmlns:a16="http://schemas.microsoft.com/office/drawing/2014/main" id="{F205C8DF-18F0-4A79-9E1B-B70174B588FE}"/>
+              </a:ext>
+            </a:extLst>
+          </p:cNvPr>
+          <p:cNvSpPr/>
+          <p:nvPr/>
+        </p:nvSpPr>
+        <p:spPr>
+          <a:xfrm>
+            <a:off x="9575074" y="2447108"/>
+            <a:ext cx="1419497" cy="2534195"/>
+          </a:xfrm>
+          <a:prstGeom prst="rect">
+            <a:avLst/>
+          </a:prstGeom>
+        </p:spPr>
+        <p:style>
+          <a:lnRef idx="2">
+            <a:schemeClr val="accent1"/>
+          </a:lnRef>
+          <a:fillRef idx="1">
+            <a:schemeClr val="lt1"/>
+          </a:fillRef>
+          <a:effectRef idx="0">
+            <a:schemeClr val="accent1"/>
+          </a:effectRef>
+          <a:fontRef idx="minor">
+            <a:schemeClr val="dk1"/>
+          </a:fontRef>
+        </p:style>
+        <p:txBody>
+          <a:bodyPr rtlCol="0" anchor="ctr"/>
+          <a:lstStyle/>
+          <a:p>
+            <a:pPr algn="ctr"/>
+            <a:r>
+              <a:rPr lang="en-US" altLang="zh-CN" dirty="0"/>
+              <a:t>BRAM</a:t>
+            </a:r>
+            <a:endParaRPr lang="zh-CN" altLang="en-US" dirty="0"/>
+          </a:p>
+        </p:txBody>
+      </p:sp>
+      <p:sp>
+        <p:nvSpPr>
+          <p:cNvPr id="5" name="TextBox 4">
+            <a:extLst>
+              <a:ext uri="{FF2B5EF4-FFF2-40B4-BE49-F238E27FC236}">
+                <a16:creationId xmlns:a16="http://schemas.microsoft.com/office/drawing/2014/main" id="{E08BE7C8-E36F-4BFC-A0E8-CC0C947B5EE8}"/>
+              </a:ext>
+            </a:extLst>
+          </p:cNvPr>
+          <p:cNvSpPr txBox="1"/>
+          <p:nvPr/>
+        </p:nvSpPr>
+        <p:spPr>
+          <a:xfrm>
+            <a:off x="8281852" y="2447108"/>
+            <a:ext cx="1149532" cy="369332"/>
+          </a:xfrm>
+          <a:prstGeom prst="rect">
+            <a:avLst/>
+          </a:prstGeom>
+          <a:noFill/>
+        </p:spPr>
+        <p:txBody>
+          <a:bodyPr wrap="square" rtlCol="0">
+            <a:spAutoFit/>
+          </a:bodyPr>
+          <a:lstStyle/>
+          <a:p>
+            <a:r>
+              <a:rPr lang="en-US" altLang="zh-CN" dirty="0"/>
+              <a:t>Neuron 1</a:t>
+            </a:r>
+            <a:endParaRPr lang="zh-CN" altLang="en-US" dirty="0"/>
+          </a:p>
+        </p:txBody>
+      </p:sp>
+      <p:sp>
+        <p:nvSpPr>
+          <p:cNvPr id="6" name="TextBox 5">
+            <a:extLst>
+              <a:ext uri="{FF2B5EF4-FFF2-40B4-BE49-F238E27FC236}">
+                <a16:creationId xmlns:a16="http://schemas.microsoft.com/office/drawing/2014/main" id="{B2C3C8DB-8076-475F-B46C-6813E239DCC4}"/>
+              </a:ext>
+            </a:extLst>
+          </p:cNvPr>
+          <p:cNvSpPr txBox="1"/>
+          <p:nvPr/>
+        </p:nvSpPr>
+        <p:spPr>
+          <a:xfrm>
+            <a:off x="8281852" y="3071055"/>
+            <a:ext cx="1149532" cy="369332"/>
+          </a:xfrm>
+          <a:prstGeom prst="rect">
+            <a:avLst/>
+          </a:prstGeom>
+          <a:noFill/>
+        </p:spPr>
+        <p:txBody>
+          <a:bodyPr wrap="square" rtlCol="0">
+            <a:spAutoFit/>
+          </a:bodyPr>
+          <a:lstStyle/>
+          <a:p>
+            <a:r>
+              <a:rPr lang="en-US" altLang="zh-CN" dirty="0"/>
+              <a:t>Neuron 2</a:t>
+            </a:r>
+            <a:endParaRPr lang="zh-CN" altLang="en-US" dirty="0"/>
+          </a:p>
+        </p:txBody>
+      </p:sp>
+      <p:sp>
+        <p:nvSpPr>
+          <p:cNvPr id="7" name="TextBox 6">
+            <a:extLst>
+              <a:ext uri="{FF2B5EF4-FFF2-40B4-BE49-F238E27FC236}">
+                <a16:creationId xmlns:a16="http://schemas.microsoft.com/office/drawing/2014/main" id="{FBCCDA02-6B67-4507-A67F-36F4F792C6D4}"/>
+              </a:ext>
+            </a:extLst>
+          </p:cNvPr>
+          <p:cNvSpPr txBox="1"/>
+          <p:nvPr/>
+        </p:nvSpPr>
+        <p:spPr>
+          <a:xfrm>
+            <a:off x="8281852" y="3695002"/>
+            <a:ext cx="1149532" cy="369332"/>
+          </a:xfrm>
+          <a:prstGeom prst="rect">
+            <a:avLst/>
+          </a:prstGeom>
+          <a:noFill/>
+        </p:spPr>
+        <p:txBody>
+          <a:bodyPr wrap="square" rtlCol="0">
+            <a:spAutoFit/>
+          </a:bodyPr>
+          <a:lstStyle/>
+          <a:p>
+            <a:r>
+              <a:rPr lang="en-US" altLang="zh-CN" dirty="0"/>
+              <a:t>Neuron 3</a:t>
+            </a:r>
+            <a:endParaRPr lang="zh-CN" altLang="en-US" dirty="0"/>
+          </a:p>
+        </p:txBody>
+      </p:sp>
+      <p:sp>
+        <p:nvSpPr>
+          <p:cNvPr id="8" name="TextBox 7">
+            <a:extLst>
+              <a:ext uri="{FF2B5EF4-FFF2-40B4-BE49-F238E27FC236}">
+                <a16:creationId xmlns:a16="http://schemas.microsoft.com/office/drawing/2014/main" id="{20E8D8D6-FC53-481D-B47C-CD250D9A6EC0}"/>
+              </a:ext>
+            </a:extLst>
+          </p:cNvPr>
+          <p:cNvSpPr txBox="1"/>
+          <p:nvPr/>
+        </p:nvSpPr>
+        <p:spPr>
+          <a:xfrm>
+            <a:off x="8281852" y="4318949"/>
+            <a:ext cx="1149532" cy="369332"/>
+          </a:xfrm>
+          <a:prstGeom prst="rect">
+            <a:avLst/>
+          </a:prstGeom>
+          <a:noFill/>
+        </p:spPr>
+        <p:txBody>
+          <a:bodyPr wrap="square" rtlCol="0">
+            <a:spAutoFit/>
+          </a:bodyPr>
+          <a:lstStyle/>
+          <a:p>
+            <a:r>
+              <a:rPr lang="en-US" altLang="zh-CN" dirty="0"/>
+              <a:t>Neuron 4</a:t>
+            </a:r>
+            <a:endParaRPr lang="zh-CN" altLang="en-US" dirty="0"/>
+          </a:p>
+        </p:txBody>
+      </p:sp>
+      <p:cxnSp>
+        <p:nvCxnSpPr>
+          <p:cNvPr id="10" name="Straight Arrow Connector 9">
+            <a:extLst>
+              <a:ext uri="{FF2B5EF4-FFF2-40B4-BE49-F238E27FC236}">
+                <a16:creationId xmlns:a16="http://schemas.microsoft.com/office/drawing/2014/main" id="{4B115443-E46E-432B-B587-FBE63C2058BC}"/>
+              </a:ext>
+            </a:extLst>
+          </p:cNvPr>
+          <p:cNvCxnSpPr/>
+          <p:nvPr/>
+        </p:nvCxnSpPr>
+        <p:spPr>
+          <a:xfrm flipH="1">
+            <a:off x="10994571" y="2447108"/>
+            <a:ext cx="953589" cy="0"/>
+          </a:xfrm>
+          <a:prstGeom prst="straightConnector1">
+            <a:avLst/>
+          </a:prstGeom>
+          <a:ln w="19050">
+            <a:tailEnd type="triangle"/>
+          </a:ln>
+        </p:spPr>
+        <p:style>
+          <a:lnRef idx="1">
+            <a:schemeClr val="dk1"/>
+          </a:lnRef>
+          <a:fillRef idx="0">
+            <a:schemeClr val="dk1"/>
+          </a:fillRef>
+          <a:effectRef idx="0">
+            <a:schemeClr val="dk1"/>
+          </a:effectRef>
+          <a:fontRef idx="minor">
+            <a:schemeClr val="tx1"/>
+          </a:fontRef>
+        </p:style>
+      </p:cxnSp>
+      <p:cxnSp>
+        <p:nvCxnSpPr>
+          <p:cNvPr id="11" name="Straight Arrow Connector 10">
+            <a:extLst>
+              <a:ext uri="{FF2B5EF4-FFF2-40B4-BE49-F238E27FC236}">
+                <a16:creationId xmlns:a16="http://schemas.microsoft.com/office/drawing/2014/main" id="{ECF7DF95-9531-4AC8-A098-93389CC873A7}"/>
+              </a:ext>
+            </a:extLst>
+          </p:cNvPr>
+          <p:cNvCxnSpPr>
+            <a:cxnSpLocks/>
+            <a:endCxn id="4" idx="3"/>
+          </p:cNvCxnSpPr>
+          <p:nvPr/>
+        </p:nvCxnSpPr>
+        <p:spPr>
+          <a:xfrm flipH="1">
+            <a:off x="10994571" y="3714206"/>
+            <a:ext cx="953589" cy="0"/>
+          </a:xfrm>
+          <a:prstGeom prst="straightConnector1">
+            <a:avLst/>
+          </a:prstGeom>
+          <a:ln w="19050">
+            <a:tailEnd type="triangle"/>
+          </a:ln>
+        </p:spPr>
+        <p:style>
+          <a:lnRef idx="1">
+            <a:schemeClr val="dk1"/>
+          </a:lnRef>
+          <a:fillRef idx="0">
+            <a:schemeClr val="dk1"/>
+          </a:fillRef>
+          <a:effectRef idx="0">
+            <a:schemeClr val="dk1"/>
+          </a:effectRef>
+          <a:fontRef idx="minor">
+            <a:schemeClr val="tx1"/>
+          </a:fontRef>
+        </p:style>
+      </p:cxnSp>
+      <p:sp>
+        <p:nvSpPr>
+          <p:cNvPr id="15" name="TextBox 14">
+            <a:extLst>
+              <a:ext uri="{FF2B5EF4-FFF2-40B4-BE49-F238E27FC236}">
+                <a16:creationId xmlns:a16="http://schemas.microsoft.com/office/drawing/2014/main" id="{8B57114D-9E12-46A2-8024-E3F195FDA3DB}"/>
+              </a:ext>
+            </a:extLst>
+          </p:cNvPr>
+          <p:cNvSpPr txBox="1"/>
+          <p:nvPr/>
+        </p:nvSpPr>
+        <p:spPr>
+          <a:xfrm>
+            <a:off x="11138263" y="2107474"/>
+            <a:ext cx="748937" cy="369332"/>
+          </a:xfrm>
+          <a:prstGeom prst="rect">
+            <a:avLst/>
+          </a:prstGeom>
+          <a:noFill/>
+        </p:spPr>
+        <p:txBody>
+          <a:bodyPr wrap="square" rtlCol="0">
+            <a:spAutoFit/>
+          </a:bodyPr>
+          <a:lstStyle/>
+          <a:p>
+            <a:pPr algn="ctr"/>
+            <a:r>
+              <a:rPr lang="en-US" altLang="zh-CN" dirty="0"/>
+              <a:t>Ptr1</a:t>
+            </a:r>
+            <a:endParaRPr lang="zh-CN" altLang="en-US" dirty="0"/>
+          </a:p>
+        </p:txBody>
+      </p:sp>
+      <p:sp>
+        <p:nvSpPr>
+          <p:cNvPr id="16" name="TextBox 15">
+            <a:extLst>
+              <a:ext uri="{FF2B5EF4-FFF2-40B4-BE49-F238E27FC236}">
+                <a16:creationId xmlns:a16="http://schemas.microsoft.com/office/drawing/2014/main" id="{E3B582D6-C19C-4206-95BA-35C71EE52E22}"/>
+              </a:ext>
+            </a:extLst>
+          </p:cNvPr>
+          <p:cNvSpPr txBox="1"/>
+          <p:nvPr/>
+        </p:nvSpPr>
+        <p:spPr>
+          <a:xfrm>
+            <a:off x="11138263" y="3375353"/>
+            <a:ext cx="748937" cy="369332"/>
+          </a:xfrm>
+          <a:prstGeom prst="rect">
+            <a:avLst/>
+          </a:prstGeom>
+          <a:noFill/>
+        </p:spPr>
+        <p:txBody>
+          <a:bodyPr wrap="square" rtlCol="0">
+            <a:spAutoFit/>
+          </a:bodyPr>
+          <a:lstStyle/>
+          <a:p>
+            <a:pPr algn="ctr"/>
+            <a:r>
+              <a:rPr lang="en-US" altLang="zh-CN" dirty="0"/>
+              <a:t>Ptr2</a:t>
+            </a:r>
+            <a:endParaRPr lang="zh-CN" altLang="en-US" dirty="0"/>
+          </a:p>
+        </p:txBody>
+      </p:sp>
+      <p:sp>
+        <p:nvSpPr>
+          <p:cNvPr id="17" name="TextBox 16">
+            <a:extLst>
+              <a:ext uri="{FF2B5EF4-FFF2-40B4-BE49-F238E27FC236}">
+                <a16:creationId xmlns:a16="http://schemas.microsoft.com/office/drawing/2014/main" id="{148BECC0-3EB6-444B-BA9B-4DE732C1FB24}"/>
+              </a:ext>
+            </a:extLst>
+          </p:cNvPr>
+          <p:cNvSpPr txBox="1"/>
+          <p:nvPr/>
+        </p:nvSpPr>
+        <p:spPr>
+          <a:xfrm>
+            <a:off x="8464731" y="5347063"/>
+            <a:ext cx="3579223" cy="923330"/>
+          </a:xfrm>
+          <a:prstGeom prst="rect">
+            <a:avLst/>
+          </a:prstGeom>
+          <a:noFill/>
+        </p:spPr>
+        <p:txBody>
+          <a:bodyPr wrap="square" rtlCol="0">
+            <a:spAutoFit/>
+          </a:bodyPr>
+          <a:lstStyle/>
+          <a:p>
+            <a:r>
+              <a:rPr lang="en-US" altLang="zh-CN" dirty="0"/>
+              <a:t>Pointers simply iterate downward during the forward pass, reading weights and supplying to the kernel</a:t>
+            </a:r>
+            <a:endParaRPr lang="zh-CN" altLang="en-US" dirty="0"/>
+          </a:p>
+        </p:txBody>
+      </p:sp>
+    </p:spTree>
+    <p:extLst>
+      <p:ext uri="{BB962C8B-B14F-4D97-AF65-F5344CB8AC3E}">
+        <p14:creationId xmlns:p14="http://schemas.microsoft.com/office/powerpoint/2010/main" val="2909220466"/>
+      </p:ext>
+    </p:extLst>
+  </p:cSld>
+  <p:clrMapOvr>
+    <a:masterClrMapping/>
+  </p:clrMapOvr>
+</p:sld>
+</file>
+
+<file path=ppt/slides/slide5.xml><?xml version="1.0" encoding="utf-8"?>
+<p:sld xmlns:a="http://schemas.openxmlformats.org/drawingml/2006/main" xmlns:r="http://schemas.openxmlformats.org/officeDocument/2006/relationships" xmlns:p="http://schemas.openxmlformats.org/presentationml/2006/main">
+  <p:cSld>
+    <p:spTree>
+      <p:nvGrpSpPr>
+        <p:cNvPr id="1" name=""/>
+        <p:cNvGrpSpPr/>
+        <p:nvPr/>
+      </p:nvGrpSpPr>
+      <p:grpSpPr>
+        <a:xfrm>
+          <a:off x="0" y="0"/>
+          <a:ext cx="0" cy="0"/>
+          <a:chOff x="0" y="0"/>
+          <a:chExt cx="0" cy="0"/>
+        </a:xfrm>
+      </p:grpSpPr>
+      <p:sp>
+        <p:nvSpPr>
+          <p:cNvPr id="2" name="Title 1">
+            <a:extLst>
+              <a:ext uri="{FF2B5EF4-FFF2-40B4-BE49-F238E27FC236}">
                 <a16:creationId xmlns:a16="http://schemas.microsoft.com/office/drawing/2014/main" id="{EE39612F-DA51-489E-A871-103116DC6FF4}"/>
               </a:ext>
             </a:extLst>
@@ -3920,7 +4425,7 @@
 </p:sld>
 </file>
 
-<file path=ppt/slides/slide5.xml><?xml version="1.0" encoding="utf-8"?>
+<file path=ppt/slides/slide6.xml><?xml version="1.0" encoding="utf-8"?>
 <p:sld xmlns:a="http://schemas.openxmlformats.org/drawingml/2006/main" xmlns:r="http://schemas.openxmlformats.org/officeDocument/2006/relationships" xmlns:p="http://schemas.openxmlformats.org/presentationml/2006/main">
   <p:cSld>
     <p:spTree>

</xml_diff>